<commit_message>
on tuesday, will revise my 1min slide
</commit_message>
<xml_diff>
--- a/PosterSession2017/1min.pptx
+++ b/PosterSession2017/1min.pptx
@@ -483,7 +483,7 @@
       </p:grpSpPr>
       <p:sp>
         <p:nvSpPr>
-          <p:cNvPr id="11" name="スライド番号"/>
+          <p:cNvPr id="11" name="Slide Number"/>
           <p:cNvSpPr txBox="1"/>
           <p:nvPr>
             <p:ph type="sldNum" sz="quarter" idx="2"/>
@@ -538,7 +538,7 @@
       </p:grpSpPr>
       <p:sp>
         <p:nvSpPr>
-          <p:cNvPr id="2" name="タイトルテキスト"/>
+          <p:cNvPr id="2" name="Title Text"/>
           <p:cNvSpPr txBox="1"/>
           <p:nvPr>
             <p:ph type="title"/>
@@ -567,14 +567,14 @@
           <a:p>
             <a:pPr/>
             <a:r>
-              <a:t>タイトルテキスト</a:t>
+              <a:t>Title Text</a:t>
             </a:r>
           </a:p>
         </p:txBody>
       </p:sp>
       <p:sp>
         <p:nvSpPr>
-          <p:cNvPr id="3" name="本文レベル1…"/>
+          <p:cNvPr id="3" name="Body Level One…"/>
           <p:cNvSpPr txBox="1"/>
           <p:nvPr>
             <p:ph type="body" idx="1"/>
@@ -603,38 +603,38 @@
           <a:p>
             <a:pPr/>
             <a:r>
-              <a:t>本文レベル1</a:t>
+              <a:t>Body Level One</a:t>
             </a:r>
           </a:p>
           <a:p>
             <a:pPr lvl="1"/>
             <a:r>
-              <a:t>本文レベル2</a:t>
+              <a:t>Body Level Two</a:t>
             </a:r>
           </a:p>
           <a:p>
             <a:pPr lvl="2"/>
             <a:r>
-              <a:t>本文レベル3</a:t>
+              <a:t>Body Level Three</a:t>
             </a:r>
           </a:p>
           <a:p>
             <a:pPr lvl="3"/>
             <a:r>
-              <a:t>本文レベル4</a:t>
+              <a:t>Body Level Four</a:t>
             </a:r>
           </a:p>
           <a:p>
             <a:pPr lvl="4"/>
             <a:r>
-              <a:t>本文レベル5</a:t>
+              <a:t>Body Level Five</a:t>
             </a:r>
           </a:p>
         </p:txBody>
       </p:sp>
       <p:sp>
         <p:nvSpPr>
-          <p:cNvPr id="4" name="スライド番号"/>
+          <p:cNvPr id="4" name="Slide Number"/>
           <p:cNvSpPr txBox="1"/>
           <p:nvPr>
             <p:ph type="sldNum" sz="quarter" idx="2"/>
@@ -1756,7 +1756,7 @@
       </p:pic>
       <p:grpSp>
         <p:nvGrpSpPr>
-          <p:cNvPr id="32" name="グループ"/>
+          <p:cNvPr id="32" name="Group"/>
           <p:cNvGrpSpPr/>
           <p:nvPr/>
         </p:nvGrpSpPr>
@@ -1770,7 +1770,7 @@
         </p:grpSpPr>
         <p:grpSp>
           <p:nvGrpSpPr>
-            <p:cNvPr id="27" name="グループ"/>
+            <p:cNvPr id="27" name="Group"/>
             <p:cNvGrpSpPr/>
             <p:nvPr/>
           </p:nvGrpSpPr>
@@ -1940,7 +1940,7 @@
         </p:pic>
         <p:sp>
           <p:nvSpPr>
-            <p:cNvPr id="30" name="矢印"/>
+            <p:cNvPr id="30" name="Arrow"/>
             <p:cNvSpPr/>
             <p:nvPr/>
           </p:nvSpPr>
@@ -1979,7 +1979,7 @@
         </p:sp>
         <p:sp>
           <p:nvSpPr>
-            <p:cNvPr id="31" name="矢印"/>
+            <p:cNvPr id="31" name="Arrow"/>
             <p:cNvSpPr/>
             <p:nvPr/>
           </p:nvSpPr>
@@ -2035,8 +2035,8 @@
         </p:blipFill>
         <p:spPr>
           <a:xfrm>
-            <a:off x="1805395" y="1992527"/>
-            <a:ext cx="5533210" cy="228646"/>
+            <a:off x="1079500" y="2093882"/>
+            <a:ext cx="6985001" cy="363773"/>
           </a:xfrm>
           <a:prstGeom prst="rect">
             <a:avLst/>
@@ -2046,6 +2046,50 @@
           </a:ln>
         </p:spPr>
       </p:pic>
+      <p:sp>
+        <p:nvSpPr>
+          <p:cNvPr id="34" name="More detail is on my poster !!"/>
+          <p:cNvSpPr txBox="1"/>
+          <p:nvPr/>
+        </p:nvSpPr>
+        <p:spPr>
+          <a:xfrm>
+            <a:off x="5699882" y="6052733"/>
+            <a:ext cx="3133538" cy="358141"/>
+          </a:xfrm>
+          <a:prstGeom prst="rect">
+            <a:avLst/>
+          </a:prstGeom>
+          <a:ln w="12700">
+            <a:miter lim="400000"/>
+          </a:ln>
+          <a:extLst>
+            <a:ext uri="{C572A759-6A51-4108-AA02-DFA0A04FC94B}">
+              <ma14:wrappingTextBoxFlag xmlns:ma14="http://schemas.microsoft.com/office/mac/drawingml/2011/main" val="1"/>
+            </a:ext>
+          </a:extLst>
+        </p:spPr>
+        <p:txBody>
+          <a:bodyPr wrap="none" lIns="45719" rIns="45719">
+            <a:spAutoFit/>
+          </a:bodyPr>
+          <a:lstStyle>
+            <a:lvl1pPr>
+              <a:defRPr>
+                <a:solidFill>
+                  <a:srgbClr val="0433FF"/>
+                </a:solidFill>
+              </a:defRPr>
+            </a:lvl1pPr>
+          </a:lstStyle>
+          <a:p>
+            <a:pPr/>
+            <a:r>
+              <a:t>More detail is on my poster !!</a:t>
+            </a:r>
+          </a:p>
+        </p:txBody>
+      </p:sp>
     </p:spTree>
   </p:cSld>
   <p:clrMapOvr>

</xml_diff>